<commit_message>
Update TeX: Chapter 4
</commit_message>
<xml_diff>
--- a/Hidden_files/Tesis/Otros/Diagramas_de_flujo.pptx
+++ b/Hidden_files/Tesis/Otros/Diagramas_de_flujo.pptx
@@ -246,7 +246,7 @@
           <a:p>
             <a:fld id="{5F72CBEA-126E-4E35-8122-0478AC9B69BE}" type="datetimeFigureOut">
               <a:rPr lang="fr-FR" smtClean="0"/>
-              <a:t>18/12/2020</a:t>
+              <a:t>15/01/2021</a:t>
             </a:fld>
             <a:endParaRPr lang="fr-FR"/>
           </a:p>
@@ -416,7 +416,7 @@
           <a:p>
             <a:fld id="{5F72CBEA-126E-4E35-8122-0478AC9B69BE}" type="datetimeFigureOut">
               <a:rPr lang="fr-FR" smtClean="0"/>
-              <a:t>18/12/2020</a:t>
+              <a:t>15/01/2021</a:t>
             </a:fld>
             <a:endParaRPr lang="fr-FR"/>
           </a:p>
@@ -596,7 +596,7 @@
           <a:p>
             <a:fld id="{5F72CBEA-126E-4E35-8122-0478AC9B69BE}" type="datetimeFigureOut">
               <a:rPr lang="fr-FR" smtClean="0"/>
-              <a:t>18/12/2020</a:t>
+              <a:t>15/01/2021</a:t>
             </a:fld>
             <a:endParaRPr lang="fr-FR"/>
           </a:p>
@@ -766,7 +766,7 @@
           <a:p>
             <a:fld id="{5F72CBEA-126E-4E35-8122-0478AC9B69BE}" type="datetimeFigureOut">
               <a:rPr lang="fr-FR" smtClean="0"/>
-              <a:t>18/12/2020</a:t>
+              <a:t>15/01/2021</a:t>
             </a:fld>
             <a:endParaRPr lang="fr-FR"/>
           </a:p>
@@ -1012,7 +1012,7 @@
           <a:p>
             <a:fld id="{5F72CBEA-126E-4E35-8122-0478AC9B69BE}" type="datetimeFigureOut">
               <a:rPr lang="fr-FR" smtClean="0"/>
-              <a:t>18/12/2020</a:t>
+              <a:t>15/01/2021</a:t>
             </a:fld>
             <a:endParaRPr lang="fr-FR"/>
           </a:p>
@@ -1244,7 +1244,7 @@
           <a:p>
             <a:fld id="{5F72CBEA-126E-4E35-8122-0478AC9B69BE}" type="datetimeFigureOut">
               <a:rPr lang="fr-FR" smtClean="0"/>
-              <a:t>18/12/2020</a:t>
+              <a:t>15/01/2021</a:t>
             </a:fld>
             <a:endParaRPr lang="fr-FR"/>
           </a:p>
@@ -1611,7 +1611,7 @@
           <a:p>
             <a:fld id="{5F72CBEA-126E-4E35-8122-0478AC9B69BE}" type="datetimeFigureOut">
               <a:rPr lang="fr-FR" smtClean="0"/>
-              <a:t>18/12/2020</a:t>
+              <a:t>15/01/2021</a:t>
             </a:fld>
             <a:endParaRPr lang="fr-FR"/>
           </a:p>
@@ -1729,7 +1729,7 @@
           <a:p>
             <a:fld id="{5F72CBEA-126E-4E35-8122-0478AC9B69BE}" type="datetimeFigureOut">
               <a:rPr lang="fr-FR" smtClean="0"/>
-              <a:t>18/12/2020</a:t>
+              <a:t>15/01/2021</a:t>
             </a:fld>
             <a:endParaRPr lang="fr-FR"/>
           </a:p>
@@ -1824,7 +1824,7 @@
           <a:p>
             <a:fld id="{5F72CBEA-126E-4E35-8122-0478AC9B69BE}" type="datetimeFigureOut">
               <a:rPr lang="fr-FR" smtClean="0"/>
-              <a:t>18/12/2020</a:t>
+              <a:t>15/01/2021</a:t>
             </a:fld>
             <a:endParaRPr lang="fr-FR"/>
           </a:p>
@@ -2101,7 +2101,7 @@
           <a:p>
             <a:fld id="{5F72CBEA-126E-4E35-8122-0478AC9B69BE}" type="datetimeFigureOut">
               <a:rPr lang="fr-FR" smtClean="0"/>
-              <a:t>18/12/2020</a:t>
+              <a:t>15/01/2021</a:t>
             </a:fld>
             <a:endParaRPr lang="fr-FR"/>
           </a:p>
@@ -2354,7 +2354,7 @@
           <a:p>
             <a:fld id="{5F72CBEA-126E-4E35-8122-0478AC9B69BE}" type="datetimeFigureOut">
               <a:rPr lang="fr-FR" smtClean="0"/>
-              <a:t>18/12/2020</a:t>
+              <a:t>15/01/2021</a:t>
             </a:fld>
             <a:endParaRPr lang="fr-FR"/>
           </a:p>
@@ -2567,7 +2567,7 @@
           <a:p>
             <a:fld id="{5F72CBEA-126E-4E35-8122-0478AC9B69BE}" type="datetimeFigureOut">
               <a:rPr lang="fr-FR" smtClean="0"/>
-              <a:t>18/12/2020</a:t>
+              <a:t>15/01/2021</a:t>
             </a:fld>
             <a:endParaRPr lang="fr-FR"/>
           </a:p>
@@ -5276,6 +5276,177 @@
             </a:r>
           </a:p>
           <a:p>
+            <a:pPr lvl="0" algn="ctr">
+              <a:defRPr/>
+            </a:pPr>
+            <a:r>
+              <a:rPr kumimoji="0" lang="es-MX" sz="1800" b="0" i="0" u="none" strike="noStrike" kern="1200" cap="none" spc="0" normalizeH="0" baseline="0" noProof="0" dirty="0" smtClean="0">
+                <a:ln>
+                  <a:noFill/>
+                </a:ln>
+                <a:solidFill>
+                  <a:prstClr val="black"/>
+                </a:solidFill>
+                <a:effectLst/>
+                <a:uLnTx/>
+                <a:uFillTx/>
+                <a:latin typeface="Arial" panose="020B0604020202020204" pitchFamily="34" charset="0"/>
+                <a:ea typeface="+mn-ea"/>
+                <a:cs typeface="Arial" panose="020B0604020202020204" pitchFamily="34" charset="0"/>
+              </a:rPr>
+              <a:t>Generar asignaciones </a:t>
+            </a:r>
+            <a:r>
+              <a:rPr kumimoji="0" lang="es-MX" sz="1800" b="0" i="0" u="none" strike="noStrike" kern="1200" cap="none" spc="0" normalizeH="0" baseline="0" noProof="0" dirty="0">
+                <a:ln>
+                  <a:noFill/>
+                </a:ln>
+                <a:solidFill>
+                  <a:prstClr val="black"/>
+                </a:solidFill>
+                <a:effectLst/>
+                <a:uLnTx/>
+                <a:uFillTx/>
+                <a:latin typeface="Arial" panose="020B0604020202020204" pitchFamily="34" charset="0"/>
+                <a:ea typeface="+mn-ea"/>
+                <a:cs typeface="Arial" panose="020B0604020202020204" pitchFamily="34" charset="0"/>
+              </a:rPr>
+              <a:t>de materia</a:t>
+            </a:r>
+            <a:r>
+              <a:rPr lang="es-MX" dirty="0">
+                <a:solidFill>
+                  <a:prstClr val="black"/>
+                </a:solidFill>
+                <a:latin typeface="Arial" panose="020B0604020202020204" pitchFamily="34" charset="0"/>
+                <a:cs typeface="Arial" panose="020B0604020202020204" pitchFamily="34" charset="0"/>
+              </a:rPr>
+              <a:t>, </a:t>
+            </a:r>
+            <a:r>
+              <a:rPr lang="es-MX" dirty="0" smtClean="0">
+                <a:solidFill>
+                  <a:prstClr val="black"/>
+                </a:solidFill>
+                <a:latin typeface="Arial" panose="020B0604020202020204" pitchFamily="34" charset="0"/>
+                <a:cs typeface="Arial" panose="020B0604020202020204" pitchFamily="34" charset="0"/>
+              </a:rPr>
+              <a:t>profesor, </a:t>
+            </a:r>
+            <a:r>
+              <a:rPr kumimoji="0" lang="es-MX" sz="1800" b="0" i="0" u="none" strike="noStrike" kern="1200" cap="none" spc="0" normalizeH="0" baseline="0" noProof="0" dirty="0" smtClean="0">
+                <a:ln>
+                  <a:noFill/>
+                </a:ln>
+                <a:solidFill>
+                  <a:prstClr val="black"/>
+                </a:solidFill>
+                <a:effectLst/>
+                <a:uLnTx/>
+                <a:uFillTx/>
+                <a:latin typeface="Arial" panose="020B0604020202020204" pitchFamily="34" charset="0"/>
+                <a:ea typeface="+mn-ea"/>
+                <a:cs typeface="Arial" panose="020B0604020202020204" pitchFamily="34" charset="0"/>
+              </a:rPr>
+              <a:t>horario.</a:t>
+            </a:r>
+            <a:endParaRPr kumimoji="0" lang="fr-FR" sz="1800" b="0" i="0" u="none" strike="noStrike" kern="1200" cap="none" spc="0" normalizeH="0" baseline="0" noProof="0" dirty="0" smtClean="0">
+              <a:ln>
+                <a:noFill/>
+              </a:ln>
+              <a:solidFill>
+                <a:prstClr val="black"/>
+              </a:solidFill>
+              <a:effectLst/>
+              <a:uLnTx/>
+              <a:uFillTx/>
+              <a:latin typeface="Arial" panose="020B0604020202020204" pitchFamily="34" charset="0"/>
+              <a:ea typeface="+mn-ea"/>
+              <a:cs typeface="Arial" panose="020B0604020202020204" pitchFamily="34" charset="0"/>
+            </a:endParaRPr>
+          </a:p>
+        </p:txBody>
+      </p:sp>
+      <p:cxnSp>
+        <p:nvCxnSpPr>
+          <p:cNvPr id="12" name="Conector recto de flecha 11"/>
+          <p:cNvCxnSpPr>
+            <a:stCxn id="20" idx="2"/>
+            <a:endCxn id="11" idx="0"/>
+          </p:cNvCxnSpPr>
+          <p:nvPr/>
+        </p:nvCxnSpPr>
+        <p:spPr>
+          <a:xfrm flipH="1">
+            <a:off x="5166619" y="1899804"/>
+            <a:ext cx="2495" cy="336826"/>
+          </a:xfrm>
+          <a:prstGeom prst="straightConnector1">
+            <a:avLst/>
+          </a:prstGeom>
+          <a:ln>
+            <a:solidFill>
+              <a:schemeClr val="tx1"/>
+            </a:solidFill>
+            <a:tailEnd type="triangle"/>
+          </a:ln>
+        </p:spPr>
+        <p:style>
+          <a:lnRef idx="1">
+            <a:schemeClr val="accent1"/>
+          </a:lnRef>
+          <a:fillRef idx="0">
+            <a:schemeClr val="accent1"/>
+          </a:fillRef>
+          <a:effectRef idx="0">
+            <a:schemeClr val="accent1"/>
+          </a:effectRef>
+          <a:fontRef idx="minor">
+            <a:schemeClr val="tx1"/>
+          </a:fontRef>
+        </p:style>
+      </p:cxnSp>
+      <p:sp>
+        <p:nvSpPr>
+          <p:cNvPr id="13" name="Rectángulo 12"/>
+          <p:cNvSpPr/>
+          <p:nvPr/>
+        </p:nvSpPr>
+        <p:spPr>
+          <a:xfrm>
+            <a:off x="401969" y="5648307"/>
+            <a:ext cx="2390503" cy="796834"/>
+          </a:xfrm>
+          <a:prstGeom prst="rect">
+            <a:avLst/>
+          </a:prstGeom>
+          <a:noFill/>
+          <a:ln>
+            <a:solidFill>
+              <a:schemeClr val="tx1"/>
+            </a:solidFill>
+          </a:ln>
+        </p:spPr>
+        <p:style>
+          <a:lnRef idx="2">
+            <a:schemeClr val="accent1">
+              <a:shade val="50000"/>
+            </a:schemeClr>
+          </a:lnRef>
+          <a:fillRef idx="1">
+            <a:schemeClr val="accent1"/>
+          </a:fillRef>
+          <a:effectRef idx="0">
+            <a:schemeClr val="accent1"/>
+          </a:effectRef>
+          <a:fontRef idx="minor">
+            <a:schemeClr val="lt1"/>
+          </a:fontRef>
+        </p:style>
+        <p:txBody>
+          <a:bodyPr rtlCol="0" anchor="ctr"/>
+          <a:lstStyle/>
+          <a:p>
             <a:pPr marL="0" marR="0" lvl="0" indent="0" algn="ctr" defTabSz="914400" rtl="0" eaLnBrk="1" fontAlgn="auto" latinLnBrk="0" hangingPunct="1">
               <a:lnSpc>
                 <a:spcPct val="100000"/>
@@ -5308,24 +5479,20 @@
                 <a:ea typeface="+mn-ea"/>
                 <a:cs typeface="Arial" panose="020B0604020202020204" pitchFamily="34" charset="0"/>
               </a:rPr>
-              <a:t>Generar asignaciones </a:t>
-            </a:r>
-            <a:r>
-              <a:rPr kumimoji="0" lang="es-MX" sz="1800" b="0" i="0" u="none" strike="noStrike" kern="1200" cap="none" spc="0" normalizeH="0" baseline="0" noProof="0" dirty="0">
-                <a:ln>
-                  <a:noFill/>
-                </a:ln>
+              <a:t>(5)</a:t>
+            </a:r>
+          </a:p>
+          <a:p>
+            <a:pPr lvl="0" algn="ctr"/>
+            <a:r>
+              <a:rPr lang="es-MX" dirty="0">
                 <a:solidFill>
                   <a:prstClr val="black"/>
                 </a:solidFill>
-                <a:effectLst/>
-                <a:uLnTx/>
-                <a:uFillTx/>
-                <a:latin typeface="Arial" panose="020B0604020202020204" pitchFamily="34" charset="0"/>
-                <a:ea typeface="+mn-ea"/>
-                <a:cs typeface="Arial" panose="020B0604020202020204" pitchFamily="34" charset="0"/>
-              </a:rPr>
-              <a:t>de materia, horario,</a:t>
+                <a:latin typeface="Arial" panose="020B0604020202020204" pitchFamily="34" charset="0"/>
+                <a:cs typeface="Arial" panose="020B0604020202020204" pitchFamily="34" charset="0"/>
+              </a:rPr>
+              <a:t>Simular </a:t>
             </a:r>
             <a:r>
               <a:rPr kumimoji="0" lang="es-MX" sz="1800" b="0" i="0" u="none" strike="noStrike" kern="1200" cap="none" spc="0" normalizeH="0" baseline="0" noProof="0" dirty="0" smtClean="0">
@@ -5342,40 +5509,7 @@
                 <a:ea typeface="+mn-ea"/>
                 <a:cs typeface="Arial" panose="020B0604020202020204" pitchFamily="34" charset="0"/>
               </a:rPr>
-              <a:t/>
-            </a:r>
-            <a:br>
-              <a:rPr kumimoji="0" lang="es-MX" sz="1800" b="0" i="0" u="none" strike="noStrike" kern="1200" cap="none" spc="0" normalizeH="0" baseline="0" noProof="0" dirty="0" smtClean="0">
-                <a:ln>
-                  <a:noFill/>
-                </a:ln>
-                <a:solidFill>
-                  <a:prstClr val="black"/>
-                </a:solidFill>
-                <a:effectLst/>
-                <a:uLnTx/>
-                <a:uFillTx/>
-                <a:latin typeface="Arial" panose="020B0604020202020204" pitchFamily="34" charset="0"/>
-                <a:ea typeface="+mn-ea"/>
-                <a:cs typeface="Arial" panose="020B0604020202020204" pitchFamily="34" charset="0"/>
-              </a:rPr>
-            </a:br>
-            <a:r>
-              <a:rPr kumimoji="0" lang="es-MX" sz="1800" b="0" i="0" u="none" strike="noStrike" kern="1200" cap="none" spc="0" normalizeH="0" baseline="0" noProof="0" dirty="0" smtClean="0">
-                <a:ln>
-                  <a:noFill/>
-                </a:ln>
-                <a:solidFill>
-                  <a:prstClr val="black"/>
-                </a:solidFill>
-                <a:effectLst/>
-                <a:uLnTx/>
-                <a:uFillTx/>
-                <a:latin typeface="Arial" panose="020B0604020202020204" pitchFamily="34" charset="0"/>
-                <a:ea typeface="+mn-ea"/>
-                <a:cs typeface="Arial" panose="020B0604020202020204" pitchFamily="34" charset="0"/>
-              </a:rPr>
-              <a:t>profesor.</a:t>
+              <a:t>esqueletos</a:t>
             </a:r>
             <a:endParaRPr kumimoji="0" lang="fr-FR" sz="1800" b="0" i="0" u="none" strike="noStrike" kern="1200" cap="none" spc="0" normalizeH="0" baseline="0" noProof="0" dirty="0" smtClean="0">
               <a:ln>
@@ -5394,55 +5528,16 @@
           </a:p>
         </p:txBody>
       </p:sp>
-      <p:cxnSp>
-        <p:nvCxnSpPr>
-          <p:cNvPr id="12" name="Conector recto de flecha 11"/>
-          <p:cNvCxnSpPr>
-            <a:stCxn id="20" idx="2"/>
-            <a:endCxn id="11" idx="0"/>
-          </p:cNvCxnSpPr>
-          <p:nvPr/>
-        </p:nvCxnSpPr>
-        <p:spPr>
-          <a:xfrm flipH="1">
-            <a:off x="5166619" y="1899804"/>
-            <a:ext cx="2495" cy="336826"/>
-          </a:xfrm>
-          <a:prstGeom prst="straightConnector1">
-            <a:avLst/>
-          </a:prstGeom>
-          <a:ln>
-            <a:solidFill>
-              <a:schemeClr val="tx1"/>
-            </a:solidFill>
-            <a:tailEnd type="triangle"/>
-          </a:ln>
-        </p:spPr>
-        <p:style>
-          <a:lnRef idx="1">
-            <a:schemeClr val="accent1"/>
-          </a:lnRef>
-          <a:fillRef idx="0">
-            <a:schemeClr val="accent1"/>
-          </a:fillRef>
-          <a:effectRef idx="0">
-            <a:schemeClr val="accent1"/>
-          </a:effectRef>
-          <a:fontRef idx="minor">
-            <a:schemeClr val="tx1"/>
-          </a:fontRef>
-        </p:style>
-      </p:cxnSp>
-      <p:sp>
-        <p:nvSpPr>
-          <p:cNvPr id="13" name="Rectángulo 12"/>
+      <p:sp>
+        <p:nvSpPr>
+          <p:cNvPr id="20" name="Rectángulo 19"/>
           <p:cNvSpPr/>
           <p:nvPr/>
         </p:nvSpPr>
         <p:spPr>
           <a:xfrm>
-            <a:off x="401969" y="5648307"/>
-            <a:ext cx="2390503" cy="796834"/>
+            <a:off x="3742543" y="1102970"/>
+            <a:ext cx="2853142" cy="796834"/>
           </a:xfrm>
           <a:prstGeom prst="rect">
             <a:avLst/>
@@ -5506,95 +5601,9 @@
                 <a:ea typeface="+mn-ea"/>
                 <a:cs typeface="Arial" panose="020B0604020202020204" pitchFamily="34" charset="0"/>
               </a:rPr>
-              <a:t>(5)</a:t>
-            </a:r>
-          </a:p>
-          <a:p>
-            <a:pPr lvl="0" algn="ctr"/>
-            <a:r>
-              <a:rPr lang="es-MX" dirty="0">
-                <a:solidFill>
-                  <a:prstClr val="black"/>
-                </a:solidFill>
-                <a:latin typeface="Arial" panose="020B0604020202020204" pitchFamily="34" charset="0"/>
-                <a:cs typeface="Arial" panose="020B0604020202020204" pitchFamily="34" charset="0"/>
-              </a:rPr>
-              <a:t>Simular </a:t>
-            </a:r>
-            <a:r>
-              <a:rPr kumimoji="0" lang="es-MX" sz="1800" b="0" i="0" u="none" strike="noStrike" kern="1200" cap="none" spc="0" normalizeH="0" baseline="0" noProof="0" dirty="0" smtClean="0">
-                <a:ln>
-                  <a:noFill/>
-                </a:ln>
-                <a:solidFill>
-                  <a:prstClr val="black"/>
-                </a:solidFill>
-                <a:effectLst/>
-                <a:uLnTx/>
-                <a:uFillTx/>
-                <a:latin typeface="Arial" panose="020B0604020202020204" pitchFamily="34" charset="0"/>
-                <a:ea typeface="+mn-ea"/>
-                <a:cs typeface="Arial" panose="020B0604020202020204" pitchFamily="34" charset="0"/>
-              </a:rPr>
-              <a:t>esqueletos</a:t>
-            </a:r>
-            <a:endParaRPr kumimoji="0" lang="fr-FR" sz="1800" b="0" i="0" u="none" strike="noStrike" kern="1200" cap="none" spc="0" normalizeH="0" baseline="0" noProof="0" dirty="0" smtClean="0">
-              <a:ln>
-                <a:noFill/>
-              </a:ln>
-              <a:solidFill>
-                <a:prstClr val="black"/>
-              </a:solidFill>
-              <a:effectLst/>
-              <a:uLnTx/>
-              <a:uFillTx/>
-              <a:latin typeface="Arial" panose="020B0604020202020204" pitchFamily="34" charset="0"/>
-              <a:ea typeface="+mn-ea"/>
-              <a:cs typeface="Arial" panose="020B0604020202020204" pitchFamily="34" charset="0"/>
-            </a:endParaRPr>
-          </a:p>
-        </p:txBody>
-      </p:sp>
-      <p:sp>
-        <p:nvSpPr>
-          <p:cNvPr id="20" name="Rectángulo 19"/>
-          <p:cNvSpPr/>
-          <p:nvPr/>
-        </p:nvSpPr>
-        <p:spPr>
-          <a:xfrm>
-            <a:off x="3742543" y="1102970"/>
-            <a:ext cx="2853142" cy="796834"/>
-          </a:xfrm>
-          <a:prstGeom prst="rect">
-            <a:avLst/>
-          </a:prstGeom>
-          <a:noFill/>
-          <a:ln>
-            <a:solidFill>
-              <a:schemeClr val="tx1"/>
-            </a:solidFill>
-          </a:ln>
-        </p:spPr>
-        <p:style>
-          <a:lnRef idx="2">
-            <a:schemeClr val="accent1">
-              <a:shade val="50000"/>
-            </a:schemeClr>
-          </a:lnRef>
-          <a:fillRef idx="1">
-            <a:schemeClr val="accent1"/>
-          </a:fillRef>
-          <a:effectRef idx="0">
-            <a:schemeClr val="accent1"/>
-          </a:effectRef>
-          <a:fontRef idx="minor">
-            <a:schemeClr val="lt1"/>
-          </a:fontRef>
-        </p:style>
-        <p:txBody>
-          <a:bodyPr rtlCol="0" anchor="ctr"/>
-          <a:lstStyle/>
+              <a:t>(4b)</a:t>
+            </a:r>
+          </a:p>
           <a:p>
             <a:pPr marL="0" marR="0" lvl="0" indent="0" algn="ctr" defTabSz="914400" rtl="0" eaLnBrk="1" fontAlgn="auto" latinLnBrk="0" hangingPunct="1">
               <a:lnSpc>
@@ -5628,9 +5637,65 @@
                 <a:ea typeface="+mn-ea"/>
                 <a:cs typeface="Arial" panose="020B0604020202020204" pitchFamily="34" charset="0"/>
               </a:rPr>
-              <a:t>(4b)</a:t>
-            </a:r>
-          </a:p>
+              <a:t>Simular solicitudes de profesores (pseudo-real)</a:t>
+            </a:r>
+            <a:endParaRPr kumimoji="0" lang="fr-FR" sz="1800" b="0" i="0" u="none" strike="noStrike" kern="1200" cap="none" spc="0" normalizeH="0" baseline="0" noProof="0" dirty="0" smtClean="0">
+              <a:ln>
+                <a:noFill/>
+              </a:ln>
+              <a:solidFill>
+                <a:prstClr val="black"/>
+              </a:solidFill>
+              <a:effectLst/>
+              <a:uLnTx/>
+              <a:uFillTx/>
+              <a:latin typeface="Arial" panose="020B0604020202020204" pitchFamily="34" charset="0"/>
+              <a:ea typeface="+mn-ea"/>
+              <a:cs typeface="Arial" panose="020B0604020202020204" pitchFamily="34" charset="0"/>
+            </a:endParaRPr>
+          </a:p>
+        </p:txBody>
+      </p:sp>
+      <p:sp>
+        <p:nvSpPr>
+          <p:cNvPr id="22" name="Rectángulo 21"/>
+          <p:cNvSpPr/>
+          <p:nvPr/>
+        </p:nvSpPr>
+        <p:spPr>
+          <a:xfrm>
+            <a:off x="4360577" y="3828303"/>
+            <a:ext cx="1617073" cy="855617"/>
+          </a:xfrm>
+          <a:prstGeom prst="rect">
+            <a:avLst/>
+          </a:prstGeom>
+          <a:noFill/>
+          <a:ln>
+            <a:solidFill>
+              <a:schemeClr val="tx1"/>
+            </a:solidFill>
+          </a:ln>
+        </p:spPr>
+        <p:style>
+          <a:lnRef idx="2">
+            <a:schemeClr val="accent1">
+              <a:shade val="50000"/>
+            </a:schemeClr>
+          </a:lnRef>
+          <a:fillRef idx="1">
+            <a:schemeClr val="accent1"/>
+          </a:fillRef>
+          <a:effectRef idx="0">
+            <a:schemeClr val="accent1"/>
+          </a:effectRef>
+          <a:fontRef idx="minor">
+            <a:schemeClr val="lt1"/>
+          </a:fontRef>
+        </p:style>
+        <p:txBody>
+          <a:bodyPr rtlCol="0" anchor="ctr"/>
+          <a:lstStyle/>
           <a:p>
             <a:pPr marL="0" marR="0" lvl="0" indent="0" algn="ctr" defTabSz="914400" rtl="0" eaLnBrk="1" fontAlgn="auto" latinLnBrk="0" hangingPunct="1">
               <a:lnSpc>
@@ -5664,65 +5729,9 @@
                 <a:ea typeface="+mn-ea"/>
                 <a:cs typeface="Arial" panose="020B0604020202020204" pitchFamily="34" charset="0"/>
               </a:rPr>
-              <a:t>Simular solicitudes de profesores (pseudo-real)</a:t>
-            </a:r>
-            <a:endParaRPr kumimoji="0" lang="fr-FR" sz="1800" b="0" i="0" u="none" strike="noStrike" kern="1200" cap="none" spc="0" normalizeH="0" baseline="0" noProof="0" dirty="0" smtClean="0">
-              <a:ln>
-                <a:noFill/>
-              </a:ln>
-              <a:solidFill>
-                <a:prstClr val="black"/>
-              </a:solidFill>
-              <a:effectLst/>
-              <a:uLnTx/>
-              <a:uFillTx/>
-              <a:latin typeface="Arial" panose="020B0604020202020204" pitchFamily="34" charset="0"/>
-              <a:ea typeface="+mn-ea"/>
-              <a:cs typeface="Arial" panose="020B0604020202020204" pitchFamily="34" charset="0"/>
-            </a:endParaRPr>
-          </a:p>
-        </p:txBody>
-      </p:sp>
-      <p:sp>
-        <p:nvSpPr>
-          <p:cNvPr id="22" name="Rectángulo 21"/>
-          <p:cNvSpPr/>
-          <p:nvPr/>
-        </p:nvSpPr>
-        <p:spPr>
-          <a:xfrm>
-            <a:off x="4360577" y="3828303"/>
-            <a:ext cx="1617073" cy="855617"/>
-          </a:xfrm>
-          <a:prstGeom prst="rect">
-            <a:avLst/>
-          </a:prstGeom>
-          <a:noFill/>
-          <a:ln>
-            <a:solidFill>
-              <a:schemeClr val="tx1"/>
-            </a:solidFill>
-          </a:ln>
-        </p:spPr>
-        <p:style>
-          <a:lnRef idx="2">
-            <a:schemeClr val="accent1">
-              <a:shade val="50000"/>
-            </a:schemeClr>
-          </a:lnRef>
-          <a:fillRef idx="1">
-            <a:schemeClr val="accent1"/>
-          </a:fillRef>
-          <a:effectRef idx="0">
-            <a:schemeClr val="accent1"/>
-          </a:effectRef>
-          <a:fontRef idx="minor">
-            <a:schemeClr val="lt1"/>
-          </a:fontRef>
-        </p:style>
-        <p:txBody>
-          <a:bodyPr rtlCol="0" anchor="ctr"/>
-          <a:lstStyle/>
+              <a:t>(7)</a:t>
+            </a:r>
+          </a:p>
           <a:p>
             <a:pPr marL="0" marR="0" lvl="0" indent="0" algn="ctr" defTabSz="914400" rtl="0" eaLnBrk="1" fontAlgn="auto" latinLnBrk="0" hangingPunct="1">
               <a:lnSpc>
@@ -5756,9 +5765,65 @@
                 <a:ea typeface="+mn-ea"/>
                 <a:cs typeface="Arial" panose="020B0604020202020204" pitchFamily="34" charset="0"/>
               </a:rPr>
-              <a:t>(7)</a:t>
-            </a:r>
-          </a:p>
+              <a:t>Calificar asignaciones</a:t>
+            </a:r>
+            <a:endParaRPr kumimoji="0" lang="fr-FR" sz="1800" b="0" i="0" u="none" strike="noStrike" kern="1200" cap="none" spc="0" normalizeH="0" baseline="0" noProof="0" dirty="0" smtClean="0">
+              <a:ln>
+                <a:noFill/>
+              </a:ln>
+              <a:solidFill>
+                <a:prstClr val="black"/>
+              </a:solidFill>
+              <a:effectLst/>
+              <a:uLnTx/>
+              <a:uFillTx/>
+              <a:latin typeface="Arial" panose="020B0604020202020204" pitchFamily="34" charset="0"/>
+              <a:ea typeface="+mn-ea"/>
+              <a:cs typeface="Arial" panose="020B0604020202020204" pitchFamily="34" charset="0"/>
+            </a:endParaRPr>
+          </a:p>
+        </p:txBody>
+      </p:sp>
+      <p:sp>
+        <p:nvSpPr>
+          <p:cNvPr id="23" name="Decisión 22"/>
+          <p:cNvSpPr/>
+          <p:nvPr/>
+        </p:nvSpPr>
+        <p:spPr>
+          <a:xfrm>
+            <a:off x="7540764" y="1931043"/>
+            <a:ext cx="3180578" cy="2203147"/>
+          </a:xfrm>
+          <a:prstGeom prst="flowChartDecision">
+            <a:avLst/>
+          </a:prstGeom>
+          <a:noFill/>
+          <a:ln>
+            <a:solidFill>
+              <a:schemeClr val="tx1"/>
+            </a:solidFill>
+          </a:ln>
+        </p:spPr>
+        <p:style>
+          <a:lnRef idx="2">
+            <a:schemeClr val="accent1">
+              <a:shade val="50000"/>
+            </a:schemeClr>
+          </a:lnRef>
+          <a:fillRef idx="1">
+            <a:schemeClr val="accent1"/>
+          </a:fillRef>
+          <a:effectRef idx="0">
+            <a:schemeClr val="accent1"/>
+          </a:effectRef>
+          <a:fontRef idx="minor">
+            <a:schemeClr val="lt1"/>
+          </a:fontRef>
+        </p:style>
+        <p:txBody>
+          <a:bodyPr rtlCol="0" anchor="ctr"/>
+          <a:lstStyle/>
           <a:p>
             <a:pPr marL="0" marR="0" lvl="0" indent="0" algn="ctr" defTabSz="914400" rtl="0" eaLnBrk="1" fontAlgn="auto" latinLnBrk="0" hangingPunct="1">
               <a:lnSpc>
@@ -5778,7 +5843,7 @@
               <a:defRPr/>
             </a:pPr>
             <a:r>
-              <a:rPr kumimoji="0" lang="es-MX" sz="1800" b="0" i="0" u="none" strike="noStrike" kern="1200" cap="none" spc="0" normalizeH="0" baseline="0" noProof="0" dirty="0" smtClean="0">
+              <a:rPr kumimoji="0" lang="fr-FR" sz="1800" b="0" i="0" u="none" strike="noStrike" kern="1200" cap="none" spc="0" normalizeH="0" baseline="0" noProof="0" dirty="0" smtClean="0">
                 <a:ln>
                   <a:noFill/>
                 </a:ln>
@@ -5792,65 +5857,9 @@
                 <a:ea typeface="+mn-ea"/>
                 <a:cs typeface="Arial" panose="020B0604020202020204" pitchFamily="34" charset="0"/>
               </a:rPr>
-              <a:t>Calificar asignaciones</a:t>
-            </a:r>
-            <a:endParaRPr kumimoji="0" lang="fr-FR" sz="1800" b="0" i="0" u="none" strike="noStrike" kern="1200" cap="none" spc="0" normalizeH="0" baseline="0" noProof="0" dirty="0" smtClean="0">
-              <a:ln>
-                <a:noFill/>
-              </a:ln>
-              <a:solidFill>
-                <a:prstClr val="black"/>
-              </a:solidFill>
-              <a:effectLst/>
-              <a:uLnTx/>
-              <a:uFillTx/>
-              <a:latin typeface="Arial" panose="020B0604020202020204" pitchFamily="34" charset="0"/>
-              <a:ea typeface="+mn-ea"/>
-              <a:cs typeface="Arial" panose="020B0604020202020204" pitchFamily="34" charset="0"/>
-            </a:endParaRPr>
-          </a:p>
-        </p:txBody>
-      </p:sp>
-      <p:sp>
-        <p:nvSpPr>
-          <p:cNvPr id="23" name="Decisión 22"/>
-          <p:cNvSpPr/>
-          <p:nvPr/>
-        </p:nvSpPr>
-        <p:spPr>
-          <a:xfrm>
-            <a:off x="7540764" y="1931043"/>
-            <a:ext cx="3180578" cy="2203147"/>
-          </a:xfrm>
-          <a:prstGeom prst="flowChartDecision">
-            <a:avLst/>
-          </a:prstGeom>
-          <a:noFill/>
-          <a:ln>
-            <a:solidFill>
-              <a:schemeClr val="tx1"/>
-            </a:solidFill>
-          </a:ln>
-        </p:spPr>
-        <p:style>
-          <a:lnRef idx="2">
-            <a:schemeClr val="accent1">
-              <a:shade val="50000"/>
-            </a:schemeClr>
-          </a:lnRef>
-          <a:fillRef idx="1">
-            <a:schemeClr val="accent1"/>
-          </a:fillRef>
-          <a:effectRef idx="0">
-            <a:schemeClr val="accent1"/>
-          </a:effectRef>
-          <a:fontRef idx="minor">
-            <a:schemeClr val="lt1"/>
-          </a:fontRef>
-        </p:style>
-        <p:txBody>
-          <a:bodyPr rtlCol="0" anchor="ctr"/>
-          <a:lstStyle/>
+              <a:t>(8)</a:t>
+            </a:r>
+          </a:p>
           <a:p>
             <a:pPr marL="0" marR="0" lvl="0" indent="0" algn="ctr" defTabSz="914400" rtl="0" eaLnBrk="1" fontAlgn="auto" latinLnBrk="0" hangingPunct="1">
               <a:lnSpc>
@@ -5884,9 +5893,292 @@
                 <a:ea typeface="+mn-ea"/>
                 <a:cs typeface="Arial" panose="020B0604020202020204" pitchFamily="34" charset="0"/>
               </a:rPr>
-              <a:t>(8)</a:t>
-            </a:r>
-          </a:p>
+              <a:t>¿Se encontró una buena asignación con AG?</a:t>
+            </a:r>
+            <a:endParaRPr kumimoji="0" lang="fr-FR" sz="1800" b="0" i="0" u="none" strike="noStrike" kern="1200" cap="none" spc="0" normalizeH="0" baseline="0" noProof="0" dirty="0">
+              <a:ln>
+                <a:noFill/>
+              </a:ln>
+              <a:solidFill>
+                <a:prstClr val="black"/>
+              </a:solidFill>
+              <a:effectLst/>
+              <a:uLnTx/>
+              <a:uFillTx/>
+              <a:latin typeface="Arial" panose="020B0604020202020204" pitchFamily="34" charset="0"/>
+              <a:ea typeface="+mn-ea"/>
+              <a:cs typeface="Arial" panose="020B0604020202020204" pitchFamily="34" charset="0"/>
+            </a:endParaRPr>
+          </a:p>
+        </p:txBody>
+      </p:sp>
+      <p:cxnSp>
+        <p:nvCxnSpPr>
+          <p:cNvPr id="25" name="Conector angular 24"/>
+          <p:cNvCxnSpPr>
+            <a:stCxn id="23" idx="0"/>
+            <a:endCxn id="11" idx="3"/>
+          </p:cNvCxnSpPr>
+          <p:nvPr/>
+        </p:nvCxnSpPr>
+        <p:spPr>
+          <a:xfrm rot="16200000" flipH="1" flipV="1">
+            <a:off x="7410728" y="1115999"/>
+            <a:ext cx="905281" cy="2535368"/>
+          </a:xfrm>
+          <a:prstGeom prst="bentConnector4">
+            <a:avLst>
+              <a:gd name="adj1" fmla="val -25252"/>
+              <a:gd name="adj2" fmla="val 81362"/>
+            </a:avLst>
+          </a:prstGeom>
+          <a:ln>
+            <a:solidFill>
+              <a:schemeClr val="tx1"/>
+            </a:solidFill>
+            <a:tailEnd type="triangle"/>
+          </a:ln>
+        </p:spPr>
+        <p:style>
+          <a:lnRef idx="1">
+            <a:schemeClr val="accent1"/>
+          </a:lnRef>
+          <a:fillRef idx="0">
+            <a:schemeClr val="accent1"/>
+          </a:fillRef>
+          <a:effectRef idx="0">
+            <a:schemeClr val="accent1"/>
+          </a:effectRef>
+          <a:fontRef idx="minor">
+            <a:schemeClr val="tx1"/>
+          </a:fontRef>
+        </p:style>
+      </p:cxnSp>
+      <p:sp>
+        <p:nvSpPr>
+          <p:cNvPr id="26" name="CuadroTexto 25"/>
+          <p:cNvSpPr txBox="1"/>
+          <p:nvPr/>
+        </p:nvSpPr>
+        <p:spPr>
+          <a:xfrm>
+            <a:off x="9150925" y="1665641"/>
+            <a:ext cx="1051560" cy="369332"/>
+          </a:xfrm>
+          <a:prstGeom prst="rect">
+            <a:avLst/>
+          </a:prstGeom>
+          <a:noFill/>
+        </p:spPr>
+        <p:txBody>
+          <a:bodyPr wrap="square" rtlCol="0">
+            <a:spAutoFit/>
+          </a:bodyPr>
+          <a:lstStyle/>
+          <a:p>
+            <a:pPr marL="0" marR="0" lvl="0" indent="0" algn="l" defTabSz="914400" rtl="0" eaLnBrk="1" fontAlgn="auto" latinLnBrk="0" hangingPunct="1">
+              <a:lnSpc>
+                <a:spcPct val="100000"/>
+              </a:lnSpc>
+              <a:spcBef>
+                <a:spcPts val="0"/>
+              </a:spcBef>
+              <a:spcAft>
+                <a:spcPts val="0"/>
+              </a:spcAft>
+              <a:buClrTx/>
+              <a:buSzTx/>
+              <a:buFontTx/>
+              <a:buNone/>
+              <a:tabLst/>
+              <a:defRPr/>
+            </a:pPr>
+            <a:r>
+              <a:rPr kumimoji="0" lang="fr-FR" sz="1800" b="0" i="0" u="none" strike="noStrike" kern="1200" cap="none" spc="0" normalizeH="0" baseline="0" noProof="0" dirty="0" smtClean="0">
+                <a:ln>
+                  <a:noFill/>
+                </a:ln>
+                <a:solidFill>
+                  <a:prstClr val="black"/>
+                </a:solidFill>
+                <a:effectLst/>
+                <a:uLnTx/>
+                <a:uFillTx/>
+                <a:latin typeface="Calibri" panose="020F0502020204030204"/>
+                <a:ea typeface="+mn-ea"/>
+                <a:cs typeface="+mn-cs"/>
+              </a:rPr>
+              <a:t>No</a:t>
+            </a:r>
+            <a:endParaRPr kumimoji="0" lang="fr-FR" sz="1800" b="0" i="0" u="none" strike="noStrike" kern="1200" cap="none" spc="0" normalizeH="0" baseline="0" noProof="0" dirty="0">
+              <a:ln>
+                <a:noFill/>
+              </a:ln>
+              <a:solidFill>
+                <a:prstClr val="black"/>
+              </a:solidFill>
+              <a:effectLst/>
+              <a:uLnTx/>
+              <a:uFillTx/>
+              <a:latin typeface="Calibri" panose="020F0502020204030204"/>
+              <a:ea typeface="+mn-ea"/>
+              <a:cs typeface="+mn-cs"/>
+            </a:endParaRPr>
+          </a:p>
+        </p:txBody>
+      </p:sp>
+      <p:sp>
+        <p:nvSpPr>
+          <p:cNvPr id="27" name="CuadroTexto 26"/>
+          <p:cNvSpPr txBox="1"/>
+          <p:nvPr/>
+        </p:nvSpPr>
+        <p:spPr>
+          <a:xfrm>
+            <a:off x="9131051" y="4045392"/>
+            <a:ext cx="1429989" cy="369332"/>
+          </a:xfrm>
+          <a:prstGeom prst="rect">
+            <a:avLst/>
+          </a:prstGeom>
+          <a:noFill/>
+        </p:spPr>
+        <p:txBody>
+          <a:bodyPr wrap="square" rtlCol="0">
+            <a:spAutoFit/>
+          </a:bodyPr>
+          <a:lstStyle/>
+          <a:p>
+            <a:pPr marL="0" marR="0" lvl="0" indent="0" algn="l" defTabSz="914400" rtl="0" eaLnBrk="1" fontAlgn="auto" latinLnBrk="0" hangingPunct="1">
+              <a:lnSpc>
+                <a:spcPct val="100000"/>
+              </a:lnSpc>
+              <a:spcBef>
+                <a:spcPts val="0"/>
+              </a:spcBef>
+              <a:spcAft>
+                <a:spcPts val="0"/>
+              </a:spcAft>
+              <a:buClrTx/>
+              <a:buSzTx/>
+              <a:buFontTx/>
+              <a:buNone/>
+              <a:tabLst/>
+              <a:defRPr/>
+            </a:pPr>
+            <a:r>
+              <a:rPr kumimoji="0" lang="fr-FR" sz="1800" b="0" i="0" u="none" strike="noStrike" kern="1200" cap="none" spc="0" normalizeH="0" baseline="0" noProof="0" dirty="0" smtClean="0">
+                <a:ln>
+                  <a:noFill/>
+                </a:ln>
+                <a:solidFill>
+                  <a:prstClr val="black"/>
+                </a:solidFill>
+                <a:effectLst/>
+                <a:uLnTx/>
+                <a:uFillTx/>
+                <a:latin typeface="Calibri" panose="020F0502020204030204"/>
+                <a:ea typeface="+mn-ea"/>
+                <a:cs typeface="+mn-cs"/>
+              </a:rPr>
+              <a:t>Si</a:t>
+            </a:r>
+            <a:endParaRPr kumimoji="0" lang="fr-FR" sz="1800" b="0" i="0" u="none" strike="noStrike" kern="1200" cap="none" spc="0" normalizeH="0" baseline="0" noProof="0" dirty="0">
+              <a:ln>
+                <a:noFill/>
+              </a:ln>
+              <a:solidFill>
+                <a:prstClr val="black"/>
+              </a:solidFill>
+              <a:effectLst/>
+              <a:uLnTx/>
+              <a:uFillTx/>
+              <a:latin typeface="Calibri" panose="020F0502020204030204"/>
+              <a:ea typeface="+mn-ea"/>
+              <a:cs typeface="+mn-cs"/>
+            </a:endParaRPr>
+          </a:p>
+        </p:txBody>
+      </p:sp>
+      <p:cxnSp>
+        <p:nvCxnSpPr>
+          <p:cNvPr id="29" name="Conector recto de flecha 28"/>
+          <p:cNvCxnSpPr>
+            <a:stCxn id="11" idx="2"/>
+            <a:endCxn id="22" idx="0"/>
+          </p:cNvCxnSpPr>
+          <p:nvPr/>
+        </p:nvCxnSpPr>
+        <p:spPr>
+          <a:xfrm>
+            <a:off x="5166619" y="3436018"/>
+            <a:ext cx="2495" cy="392285"/>
+          </a:xfrm>
+          <a:prstGeom prst="straightConnector1">
+            <a:avLst/>
+          </a:prstGeom>
+          <a:ln>
+            <a:solidFill>
+              <a:schemeClr val="tx1"/>
+            </a:solidFill>
+            <a:tailEnd type="triangle"/>
+          </a:ln>
+        </p:spPr>
+        <p:style>
+          <a:lnRef idx="1">
+            <a:schemeClr val="accent1"/>
+          </a:lnRef>
+          <a:fillRef idx="0">
+            <a:schemeClr val="accent1"/>
+          </a:fillRef>
+          <a:effectRef idx="0">
+            <a:schemeClr val="accent1"/>
+          </a:effectRef>
+          <a:fontRef idx="minor">
+            <a:schemeClr val="tx1"/>
+          </a:fontRef>
+        </p:style>
+      </p:cxnSp>
+      <p:sp>
+        <p:nvSpPr>
+          <p:cNvPr id="30" name="Documento 29"/>
+          <p:cNvSpPr/>
+          <p:nvPr/>
+        </p:nvSpPr>
+        <p:spPr>
+          <a:xfrm>
+            <a:off x="7836670" y="4421443"/>
+            <a:ext cx="2588762" cy="1707469"/>
+          </a:xfrm>
+          <a:prstGeom prst="flowChartDocument">
+            <a:avLst/>
+          </a:prstGeom>
+          <a:noFill/>
+          <a:ln>
+            <a:solidFill>
+              <a:schemeClr val="tx1"/>
+            </a:solidFill>
+          </a:ln>
+        </p:spPr>
+        <p:style>
+          <a:lnRef idx="2">
+            <a:schemeClr val="accent1">
+              <a:shade val="50000"/>
+            </a:schemeClr>
+          </a:lnRef>
+          <a:fillRef idx="1">
+            <a:schemeClr val="accent1"/>
+          </a:fillRef>
+          <a:effectRef idx="0">
+            <a:schemeClr val="accent1"/>
+          </a:effectRef>
+          <a:fontRef idx="minor">
+            <a:schemeClr val="lt1"/>
+          </a:fontRef>
+        </p:style>
+        <p:txBody>
+          <a:bodyPr rtlCol="0" anchor="ctr"/>
+          <a:lstStyle/>
           <a:p>
             <a:pPr marL="0" marR="0" lvl="0" indent="0" algn="ctr" defTabSz="914400" rtl="0" eaLnBrk="1" fontAlgn="auto" latinLnBrk="0" hangingPunct="1">
               <a:lnSpc>
@@ -5906,325 +6198,6 @@
               <a:defRPr/>
             </a:pPr>
             <a:r>
-              <a:rPr kumimoji="0" lang="fr-FR" sz="1800" b="0" i="0" u="none" strike="noStrike" kern="1200" cap="none" spc="0" normalizeH="0" baseline="0" noProof="0" dirty="0" smtClean="0">
-                <a:ln>
-                  <a:noFill/>
-                </a:ln>
-                <a:solidFill>
-                  <a:prstClr val="black"/>
-                </a:solidFill>
-                <a:effectLst/>
-                <a:uLnTx/>
-                <a:uFillTx/>
-                <a:latin typeface="Arial" panose="020B0604020202020204" pitchFamily="34" charset="0"/>
-                <a:ea typeface="+mn-ea"/>
-                <a:cs typeface="Arial" panose="020B0604020202020204" pitchFamily="34" charset="0"/>
-              </a:rPr>
-              <a:t>¿Se encontró una buena asignación con AG?</a:t>
-            </a:r>
-            <a:endParaRPr kumimoji="0" lang="fr-FR" sz="1800" b="0" i="0" u="none" strike="noStrike" kern="1200" cap="none" spc="0" normalizeH="0" baseline="0" noProof="0" dirty="0">
-              <a:ln>
-                <a:noFill/>
-              </a:ln>
-              <a:solidFill>
-                <a:prstClr val="black"/>
-              </a:solidFill>
-              <a:effectLst/>
-              <a:uLnTx/>
-              <a:uFillTx/>
-              <a:latin typeface="Arial" panose="020B0604020202020204" pitchFamily="34" charset="0"/>
-              <a:ea typeface="+mn-ea"/>
-              <a:cs typeface="Arial" panose="020B0604020202020204" pitchFamily="34" charset="0"/>
-            </a:endParaRPr>
-          </a:p>
-        </p:txBody>
-      </p:sp>
-      <p:cxnSp>
-        <p:nvCxnSpPr>
-          <p:cNvPr id="25" name="Conector angular 24"/>
-          <p:cNvCxnSpPr>
-            <a:stCxn id="23" idx="0"/>
-            <a:endCxn id="11" idx="3"/>
-          </p:cNvCxnSpPr>
-          <p:nvPr/>
-        </p:nvCxnSpPr>
-        <p:spPr>
-          <a:xfrm rot="16200000" flipH="1" flipV="1">
-            <a:off x="7410728" y="1115999"/>
-            <a:ext cx="905281" cy="2535368"/>
-          </a:xfrm>
-          <a:prstGeom prst="bentConnector4">
-            <a:avLst>
-              <a:gd name="adj1" fmla="val -25252"/>
-              <a:gd name="adj2" fmla="val 81362"/>
-            </a:avLst>
-          </a:prstGeom>
-          <a:ln>
-            <a:solidFill>
-              <a:schemeClr val="tx1"/>
-            </a:solidFill>
-            <a:tailEnd type="triangle"/>
-          </a:ln>
-        </p:spPr>
-        <p:style>
-          <a:lnRef idx="1">
-            <a:schemeClr val="accent1"/>
-          </a:lnRef>
-          <a:fillRef idx="0">
-            <a:schemeClr val="accent1"/>
-          </a:fillRef>
-          <a:effectRef idx="0">
-            <a:schemeClr val="accent1"/>
-          </a:effectRef>
-          <a:fontRef idx="minor">
-            <a:schemeClr val="tx1"/>
-          </a:fontRef>
-        </p:style>
-      </p:cxnSp>
-      <p:sp>
-        <p:nvSpPr>
-          <p:cNvPr id="26" name="CuadroTexto 25"/>
-          <p:cNvSpPr txBox="1"/>
-          <p:nvPr/>
-        </p:nvSpPr>
-        <p:spPr>
-          <a:xfrm>
-            <a:off x="9150925" y="1665641"/>
-            <a:ext cx="1051560" cy="369332"/>
-          </a:xfrm>
-          <a:prstGeom prst="rect">
-            <a:avLst/>
-          </a:prstGeom>
-          <a:noFill/>
-        </p:spPr>
-        <p:txBody>
-          <a:bodyPr wrap="square" rtlCol="0">
-            <a:spAutoFit/>
-          </a:bodyPr>
-          <a:lstStyle/>
-          <a:p>
-            <a:pPr marL="0" marR="0" lvl="0" indent="0" algn="l" defTabSz="914400" rtl="0" eaLnBrk="1" fontAlgn="auto" latinLnBrk="0" hangingPunct="1">
-              <a:lnSpc>
-                <a:spcPct val="100000"/>
-              </a:lnSpc>
-              <a:spcBef>
-                <a:spcPts val="0"/>
-              </a:spcBef>
-              <a:spcAft>
-                <a:spcPts val="0"/>
-              </a:spcAft>
-              <a:buClrTx/>
-              <a:buSzTx/>
-              <a:buFontTx/>
-              <a:buNone/>
-              <a:tabLst/>
-              <a:defRPr/>
-            </a:pPr>
-            <a:r>
-              <a:rPr kumimoji="0" lang="fr-FR" sz="1800" b="0" i="0" u="none" strike="noStrike" kern="1200" cap="none" spc="0" normalizeH="0" baseline="0" noProof="0" dirty="0" smtClean="0">
-                <a:ln>
-                  <a:noFill/>
-                </a:ln>
-                <a:solidFill>
-                  <a:prstClr val="black"/>
-                </a:solidFill>
-                <a:effectLst/>
-                <a:uLnTx/>
-                <a:uFillTx/>
-                <a:latin typeface="Calibri" panose="020F0502020204030204"/>
-                <a:ea typeface="+mn-ea"/>
-                <a:cs typeface="+mn-cs"/>
-              </a:rPr>
-              <a:t>No</a:t>
-            </a:r>
-            <a:endParaRPr kumimoji="0" lang="fr-FR" sz="1800" b="0" i="0" u="none" strike="noStrike" kern="1200" cap="none" spc="0" normalizeH="0" baseline="0" noProof="0" dirty="0">
-              <a:ln>
-                <a:noFill/>
-              </a:ln>
-              <a:solidFill>
-                <a:prstClr val="black"/>
-              </a:solidFill>
-              <a:effectLst/>
-              <a:uLnTx/>
-              <a:uFillTx/>
-              <a:latin typeface="Calibri" panose="020F0502020204030204"/>
-              <a:ea typeface="+mn-ea"/>
-              <a:cs typeface="+mn-cs"/>
-            </a:endParaRPr>
-          </a:p>
-        </p:txBody>
-      </p:sp>
-      <p:sp>
-        <p:nvSpPr>
-          <p:cNvPr id="27" name="CuadroTexto 26"/>
-          <p:cNvSpPr txBox="1"/>
-          <p:nvPr/>
-        </p:nvSpPr>
-        <p:spPr>
-          <a:xfrm>
-            <a:off x="9131051" y="4045392"/>
-            <a:ext cx="1429989" cy="369332"/>
-          </a:xfrm>
-          <a:prstGeom prst="rect">
-            <a:avLst/>
-          </a:prstGeom>
-          <a:noFill/>
-        </p:spPr>
-        <p:txBody>
-          <a:bodyPr wrap="square" rtlCol="0">
-            <a:spAutoFit/>
-          </a:bodyPr>
-          <a:lstStyle/>
-          <a:p>
-            <a:pPr marL="0" marR="0" lvl="0" indent="0" algn="l" defTabSz="914400" rtl="0" eaLnBrk="1" fontAlgn="auto" latinLnBrk="0" hangingPunct="1">
-              <a:lnSpc>
-                <a:spcPct val="100000"/>
-              </a:lnSpc>
-              <a:spcBef>
-                <a:spcPts val="0"/>
-              </a:spcBef>
-              <a:spcAft>
-                <a:spcPts val="0"/>
-              </a:spcAft>
-              <a:buClrTx/>
-              <a:buSzTx/>
-              <a:buFontTx/>
-              <a:buNone/>
-              <a:tabLst/>
-              <a:defRPr/>
-            </a:pPr>
-            <a:r>
-              <a:rPr kumimoji="0" lang="fr-FR" sz="1800" b="0" i="0" u="none" strike="noStrike" kern="1200" cap="none" spc="0" normalizeH="0" baseline="0" noProof="0" dirty="0" smtClean="0">
-                <a:ln>
-                  <a:noFill/>
-                </a:ln>
-                <a:solidFill>
-                  <a:prstClr val="black"/>
-                </a:solidFill>
-                <a:effectLst/>
-                <a:uLnTx/>
-                <a:uFillTx/>
-                <a:latin typeface="Calibri" panose="020F0502020204030204"/>
-                <a:ea typeface="+mn-ea"/>
-                <a:cs typeface="+mn-cs"/>
-              </a:rPr>
-              <a:t>Si</a:t>
-            </a:r>
-            <a:endParaRPr kumimoji="0" lang="fr-FR" sz="1800" b="0" i="0" u="none" strike="noStrike" kern="1200" cap="none" spc="0" normalizeH="0" baseline="0" noProof="0" dirty="0">
-              <a:ln>
-                <a:noFill/>
-              </a:ln>
-              <a:solidFill>
-                <a:prstClr val="black"/>
-              </a:solidFill>
-              <a:effectLst/>
-              <a:uLnTx/>
-              <a:uFillTx/>
-              <a:latin typeface="Calibri" panose="020F0502020204030204"/>
-              <a:ea typeface="+mn-ea"/>
-              <a:cs typeface="+mn-cs"/>
-            </a:endParaRPr>
-          </a:p>
-        </p:txBody>
-      </p:sp>
-      <p:cxnSp>
-        <p:nvCxnSpPr>
-          <p:cNvPr id="29" name="Conector recto de flecha 28"/>
-          <p:cNvCxnSpPr>
-            <a:stCxn id="11" idx="2"/>
-            <a:endCxn id="22" idx="0"/>
-          </p:cNvCxnSpPr>
-          <p:nvPr/>
-        </p:nvCxnSpPr>
-        <p:spPr>
-          <a:xfrm>
-            <a:off x="5166619" y="3436018"/>
-            <a:ext cx="2495" cy="392285"/>
-          </a:xfrm>
-          <a:prstGeom prst="straightConnector1">
-            <a:avLst/>
-          </a:prstGeom>
-          <a:ln>
-            <a:solidFill>
-              <a:schemeClr val="tx1"/>
-            </a:solidFill>
-            <a:tailEnd type="triangle"/>
-          </a:ln>
-        </p:spPr>
-        <p:style>
-          <a:lnRef idx="1">
-            <a:schemeClr val="accent1"/>
-          </a:lnRef>
-          <a:fillRef idx="0">
-            <a:schemeClr val="accent1"/>
-          </a:fillRef>
-          <a:effectRef idx="0">
-            <a:schemeClr val="accent1"/>
-          </a:effectRef>
-          <a:fontRef idx="minor">
-            <a:schemeClr val="tx1"/>
-          </a:fontRef>
-        </p:style>
-      </p:cxnSp>
-      <p:sp>
-        <p:nvSpPr>
-          <p:cNvPr id="30" name="Documento 29"/>
-          <p:cNvSpPr/>
-          <p:nvPr/>
-        </p:nvSpPr>
-        <p:spPr>
-          <a:xfrm>
-            <a:off x="7836670" y="4421443"/>
-            <a:ext cx="2588762" cy="1707469"/>
-          </a:xfrm>
-          <a:prstGeom prst="flowChartDocument">
-            <a:avLst/>
-          </a:prstGeom>
-          <a:noFill/>
-          <a:ln>
-            <a:solidFill>
-              <a:schemeClr val="tx1"/>
-            </a:solidFill>
-          </a:ln>
-        </p:spPr>
-        <p:style>
-          <a:lnRef idx="2">
-            <a:schemeClr val="accent1">
-              <a:shade val="50000"/>
-            </a:schemeClr>
-          </a:lnRef>
-          <a:fillRef idx="1">
-            <a:schemeClr val="accent1"/>
-          </a:fillRef>
-          <a:effectRef idx="0">
-            <a:schemeClr val="accent1"/>
-          </a:effectRef>
-          <a:fontRef idx="minor">
-            <a:schemeClr val="lt1"/>
-          </a:fontRef>
-        </p:style>
-        <p:txBody>
-          <a:bodyPr rtlCol="0" anchor="ctr"/>
-          <a:lstStyle/>
-          <a:p>
-            <a:pPr marL="0" marR="0" lvl="0" indent="0" algn="ctr" defTabSz="914400" rtl="0" eaLnBrk="1" fontAlgn="auto" latinLnBrk="0" hangingPunct="1">
-              <a:lnSpc>
-                <a:spcPct val="100000"/>
-              </a:lnSpc>
-              <a:spcBef>
-                <a:spcPts val="0"/>
-              </a:spcBef>
-              <a:spcAft>
-                <a:spcPts val="0"/>
-              </a:spcAft>
-              <a:buClrTx/>
-              <a:buSzTx/>
-              <a:buFontTx/>
-              <a:buNone/>
-              <a:tabLst/>
-              <a:defRPr/>
-            </a:pPr>
-            <a:r>
               <a:rPr kumimoji="0" lang="es-MX" sz="1800" b="0" i="0" u="none" strike="noStrike" kern="1200" cap="none" spc="0" normalizeH="0" baseline="0" noProof="0" dirty="0" smtClean="0">
                 <a:ln>
                   <a:noFill/>
@@ -6243,21 +6216,7 @@
             </a:r>
           </a:p>
           <a:p>
-            <a:pPr marL="0" marR="0" lvl="0" indent="0" algn="ctr" defTabSz="914400" rtl="0" eaLnBrk="1" fontAlgn="auto" latinLnBrk="0" hangingPunct="1">
-              <a:lnSpc>
-                <a:spcPct val="100000"/>
-              </a:lnSpc>
-              <a:spcBef>
-                <a:spcPts val="0"/>
-              </a:spcBef>
-              <a:spcAft>
-                <a:spcPts val="0"/>
-              </a:spcAft>
-              <a:buClrTx/>
-              <a:buSzTx/>
-              <a:buFontTx/>
-              <a:buNone/>
-              <a:tabLst/>
+            <a:pPr lvl="0" algn="ctr">
               <a:defRPr/>
             </a:pPr>
             <a:r>
@@ -6326,57 +6285,17 @@
                 <a:ea typeface="+mn-ea"/>
                 <a:cs typeface="Arial" panose="020B0604020202020204" pitchFamily="34" charset="0"/>
               </a:rPr>
-              <a:t>columnas con la asignación de materia, horario,</a:t>
-            </a:r>
-            <a:r>
-              <a:rPr kumimoji="0" lang="es-MX" sz="1800" b="0" i="0" u="none" strike="noStrike" kern="1200" cap="none" spc="0" normalizeH="0" baseline="0" noProof="0" dirty="0" smtClean="0">
-                <a:ln>
-                  <a:noFill/>
-                </a:ln>
+              <a:t>columnas con la asignación de </a:t>
+            </a:r>
+            <a:r>
+              <a:rPr lang="es-MX" dirty="0">
                 <a:solidFill>
                   <a:prstClr val="black"/>
                 </a:solidFill>
-                <a:effectLst/>
-                <a:uLnTx/>
-                <a:uFillTx/>
-                <a:latin typeface="Arial" panose="020B0604020202020204" pitchFamily="34" charset="0"/>
-                <a:ea typeface="+mn-ea"/>
-                <a:cs typeface="Arial" panose="020B0604020202020204" pitchFamily="34" charset="0"/>
-              </a:rPr>
-              <a:t/>
-            </a:r>
-            <a:br>
-              <a:rPr kumimoji="0" lang="es-MX" sz="1800" b="0" i="0" u="none" strike="noStrike" kern="1200" cap="none" spc="0" normalizeH="0" baseline="0" noProof="0" dirty="0" smtClean="0">
-                <a:ln>
-                  <a:noFill/>
-                </a:ln>
-                <a:solidFill>
-                  <a:prstClr val="black"/>
-                </a:solidFill>
-                <a:effectLst/>
-                <a:uLnTx/>
-                <a:uFillTx/>
-                <a:latin typeface="Arial" panose="020B0604020202020204" pitchFamily="34" charset="0"/>
-                <a:ea typeface="+mn-ea"/>
-                <a:cs typeface="Arial" panose="020B0604020202020204" pitchFamily="34" charset="0"/>
-              </a:rPr>
-            </a:br>
-            <a:r>
-              <a:rPr kumimoji="0" lang="es-MX" sz="1800" b="0" i="0" u="none" strike="noStrike" kern="1200" cap="none" spc="0" normalizeH="0" baseline="0" noProof="0" dirty="0" smtClean="0">
-                <a:ln>
-                  <a:noFill/>
-                </a:ln>
-                <a:solidFill>
-                  <a:prstClr val="black"/>
-                </a:solidFill>
-                <a:effectLst/>
-                <a:uLnTx/>
-                <a:uFillTx/>
-                <a:latin typeface="Arial" panose="020B0604020202020204" pitchFamily="34" charset="0"/>
-                <a:ea typeface="+mn-ea"/>
-                <a:cs typeface="Arial" panose="020B0604020202020204" pitchFamily="34" charset="0"/>
-              </a:rPr>
-              <a:t>profesor.</a:t>
+                <a:latin typeface="Arial" panose="020B0604020202020204" pitchFamily="34" charset="0"/>
+                <a:cs typeface="Arial" panose="020B0604020202020204" pitchFamily="34" charset="0"/>
+              </a:rPr>
+              <a:t>materia, profesor, horario.</a:t>
             </a:r>
             <a:endParaRPr kumimoji="0" lang="fr-FR" sz="1800" b="0" i="0" u="none" strike="noStrike" kern="1200" cap="none" spc="0" normalizeH="0" baseline="0" noProof="0" dirty="0">
               <a:ln>
@@ -7190,10 +7109,6 @@
               </a:rPr>
               <a:t>Mejor individuo de la población</a:t>
             </a:r>
-            <a:endParaRPr lang="es-MX" dirty="0" smtClean="0">
-              <a:latin typeface="Arial" panose="020B0604020202020204" pitchFamily="34" charset="0"/>
-              <a:cs typeface="Arial" panose="020B0604020202020204" pitchFamily="34" charset="0"/>
-            </a:endParaRPr>
           </a:p>
         </p:txBody>
       </p:sp>
@@ -7330,10 +7245,6 @@
               </a:rPr>
               <a:t>Simular población inicial</a:t>
             </a:r>
-            <a:endParaRPr lang="es-MX" dirty="0" smtClean="0">
-              <a:latin typeface="Arial" panose="020B0604020202020204" pitchFamily="34" charset="0"/>
-              <a:cs typeface="Arial" panose="020B0604020202020204" pitchFamily="34" charset="0"/>
-            </a:endParaRPr>
           </a:p>
         </p:txBody>
       </p:sp>
@@ -7378,21 +7289,7 @@
                 <a:latin typeface="Arial" panose="020B0604020202020204" pitchFamily="34" charset="0"/>
                 <a:cs typeface="Arial" panose="020B0604020202020204" pitchFamily="34" charset="0"/>
               </a:rPr>
-              <a:t>k </a:t>
-            </a:r>
-            <a:r>
-              <a:rPr lang="es-MX" dirty="0" smtClean="0">
-                <a:latin typeface="Arial" panose="020B0604020202020204" pitchFamily="34" charset="0"/>
-                <a:cs typeface="Arial" panose="020B0604020202020204" pitchFamily="34" charset="0"/>
-              </a:rPr>
-              <a:t>= 1</a:t>
-            </a:r>
-            <a:r>
-              <a:rPr lang="es-MX" dirty="0" smtClean="0">
-                <a:latin typeface="Arial" panose="020B0604020202020204" pitchFamily="34" charset="0"/>
-                <a:cs typeface="Arial" panose="020B0604020202020204" pitchFamily="34" charset="0"/>
-              </a:rPr>
-              <a:t>, …, n</a:t>
+              <a:t>k = 1, …, n</a:t>
             </a:r>
             <a:endParaRPr lang="es-MX" dirty="0">
               <a:latin typeface="Arial" panose="020B0604020202020204" pitchFamily="34" charset="0"/>
@@ -7617,10 +7514,6 @@
               </a:rPr>
               <a:t>Mutación</a:t>
             </a:r>
-            <a:endParaRPr lang="es-MX" dirty="0" smtClean="0">
-              <a:latin typeface="Arial" panose="020B0604020202020204" pitchFamily="34" charset="0"/>
-              <a:cs typeface="Arial" panose="020B0604020202020204" pitchFamily="34" charset="0"/>
-            </a:endParaRPr>
           </a:p>
         </p:txBody>
       </p:sp>
@@ -7757,10 +7650,6 @@
               </a:rPr>
               <a:t>Calificar población</a:t>
             </a:r>
-            <a:endParaRPr lang="es-MX" dirty="0" smtClean="0">
-              <a:latin typeface="Arial" panose="020B0604020202020204" pitchFamily="34" charset="0"/>
-              <a:cs typeface="Arial" panose="020B0604020202020204" pitchFamily="34" charset="0"/>
-            </a:endParaRPr>
           </a:p>
         </p:txBody>
       </p:sp>
@@ -7872,21 +7761,40 @@
                 <a:latin typeface="Arial" panose="020B0604020202020204" pitchFamily="34" charset="0"/>
                 <a:cs typeface="Arial" panose="020B0604020202020204" pitchFamily="34" charset="0"/>
               </a:rPr>
-              <a:t>Condición de paro</a:t>
-            </a:r>
-            <a:endParaRPr kumimoji="0" lang="fr-FR" sz="1800" b="0" i="0" u="none" strike="noStrike" kern="1200" cap="none" spc="0" normalizeH="0" baseline="0" noProof="0" dirty="0">
-              <a:ln>
-                <a:noFill/>
-              </a:ln>
-              <a:solidFill>
-                <a:prstClr val="black"/>
-              </a:solidFill>
-              <a:effectLst/>
-              <a:uLnTx/>
-              <a:uFillTx/>
-              <a:latin typeface="Arial" panose="020B0604020202020204" pitchFamily="34" charset="0"/>
-              <a:cs typeface="Arial" panose="020B0604020202020204" pitchFamily="34" charset="0"/>
-            </a:endParaRPr>
+              <a:t>¿Se cumple condición </a:t>
+            </a:r>
+            <a:r>
+              <a:rPr kumimoji="0" lang="fr-FR" sz="1800" b="0" i="0" u="none" strike="noStrike" kern="1200" cap="none" spc="0" normalizeH="0" baseline="0" noProof="0" dirty="0" smtClean="0">
+                <a:ln>
+                  <a:noFill/>
+                </a:ln>
+                <a:solidFill>
+                  <a:prstClr val="black"/>
+                </a:solidFill>
+                <a:effectLst/>
+                <a:uLnTx/>
+                <a:uFillTx/>
+                <a:latin typeface="Arial" panose="020B0604020202020204" pitchFamily="34" charset="0"/>
+                <a:cs typeface="Arial" panose="020B0604020202020204" pitchFamily="34" charset="0"/>
+              </a:rPr>
+              <a:t>de </a:t>
+            </a:r>
+            <a:r>
+              <a:rPr kumimoji="0" lang="fr-FR" sz="1800" b="0" i="0" u="none" strike="noStrike" kern="1200" cap="none" spc="0" normalizeH="0" baseline="0" noProof="0" dirty="0" smtClean="0">
+                <a:ln>
+                  <a:noFill/>
+                </a:ln>
+                <a:solidFill>
+                  <a:prstClr val="black"/>
+                </a:solidFill>
+                <a:effectLst/>
+                <a:uLnTx/>
+                <a:uFillTx/>
+                <a:latin typeface="Arial" panose="020B0604020202020204" pitchFamily="34" charset="0"/>
+                <a:cs typeface="Arial" panose="020B0604020202020204" pitchFamily="34" charset="0"/>
+              </a:rPr>
+              <a:t>paro?</a:t>
+            </a:r>
           </a:p>
         </p:txBody>
       </p:sp>
@@ -8150,10 +8058,6 @@
               </a:rPr>
               <a:t>Reemplazamiento</a:t>
             </a:r>
-            <a:endParaRPr lang="es-MX" dirty="0" smtClean="0">
-              <a:latin typeface="Arial" panose="020B0604020202020204" pitchFamily="34" charset="0"/>
-              <a:cs typeface="Arial" panose="020B0604020202020204" pitchFamily="34" charset="0"/>
-            </a:endParaRPr>
           </a:p>
         </p:txBody>
       </p:sp>

</xml_diff>